<commit_message>
rebuilding site Thu Jun 11 17:06:55 EDT 2020
</commit_message>
<xml_diff>
--- a/lectures/001-Overview.pptx
+++ b/lectures/001-Overview.pptx
@@ -5,17 +5,15 @@
     <p:sldMasterId id="2147483648" r:id="rId1"/>
   </p:sldMasterIdLst>
   <p:notesMasterIdLst>
-    <p:notesMasterId r:id="rId10"/>
+    <p:notesMasterId r:id="rId8"/>
   </p:notesMasterIdLst>
   <p:sldIdLst>
     <p:sldId id="262" r:id="rId2"/>
-    <p:sldId id="265" r:id="rId3"/>
-    <p:sldId id="263" r:id="rId4"/>
-    <p:sldId id="257" r:id="rId5"/>
-    <p:sldId id="258" r:id="rId6"/>
-    <p:sldId id="259" r:id="rId7"/>
-    <p:sldId id="264" r:id="rId8"/>
-    <p:sldId id="266" r:id="rId9"/>
+    <p:sldId id="263" r:id="rId3"/>
+    <p:sldId id="257" r:id="rId4"/>
+    <p:sldId id="258" r:id="rId5"/>
+    <p:sldId id="259" r:id="rId6"/>
+    <p:sldId id="264" r:id="rId7"/>
   </p:sldIdLst>
   <p:sldSz cx="12192000" cy="6858000"/>
   <p:notesSz cx="6858000" cy="9144000"/>
@@ -204,7 +202,7 @@
           <a:p>
             <a:fld id="{9A8075CA-E4BE-BA46-A08D-1D2A53775B0A}" type="datetimeFigureOut">
               <a:rPr lang="en-US" smtClean="0"/>
-              <a:t>6/9/20</a:t>
+              <a:t>4/29/20</a:t>
             </a:fld>
             <a:endParaRPr lang="en-US"/>
           </a:p>
@@ -711,7 +709,7 @@
           <a:p>
             <a:fld id="{23A5DD90-C89A-BB41-88A2-FC1EE1ABBA78}" type="datetimeFigureOut">
               <a:rPr lang="en-US" smtClean="0"/>
-              <a:t>6/9/20</a:t>
+              <a:t>4/29/20</a:t>
             </a:fld>
             <a:endParaRPr lang="en-US"/>
           </a:p>
@@ -913,7 +911,7 @@
           <a:p>
             <a:fld id="{23A5DD90-C89A-BB41-88A2-FC1EE1ABBA78}" type="datetimeFigureOut">
               <a:rPr lang="en-US" smtClean="0"/>
-              <a:t>6/9/20</a:t>
+              <a:t>4/29/20</a:t>
             </a:fld>
             <a:endParaRPr lang="en-US"/>
           </a:p>
@@ -1105,7 +1103,7 @@
           <a:p>
             <a:fld id="{23A5DD90-C89A-BB41-88A2-FC1EE1ABBA78}" type="datetimeFigureOut">
               <a:rPr lang="en-US" smtClean="0"/>
-              <a:t>6/9/20</a:t>
+              <a:t>4/29/20</a:t>
             </a:fld>
             <a:endParaRPr lang="en-US"/>
           </a:p>
@@ -1374,7 +1372,7 @@
           <a:p>
             <a:fld id="{23A5DD90-C89A-BB41-88A2-FC1EE1ABBA78}" type="datetimeFigureOut">
               <a:rPr lang="en-US" smtClean="0"/>
-              <a:t>6/9/20</a:t>
+              <a:t>4/29/20</a:t>
             </a:fld>
             <a:endParaRPr lang="en-US"/>
           </a:p>
@@ -1627,7 +1625,7 @@
           <a:p>
             <a:fld id="{23A5DD90-C89A-BB41-88A2-FC1EE1ABBA78}" type="datetimeFigureOut">
               <a:rPr lang="en-US" smtClean="0"/>
-              <a:t>6/9/20</a:t>
+              <a:t>4/29/20</a:t>
             </a:fld>
             <a:endParaRPr lang="en-US"/>
           </a:p>
@@ -2015,7 +2013,7 @@
           <a:p>
             <a:fld id="{23A5DD90-C89A-BB41-88A2-FC1EE1ABBA78}" type="datetimeFigureOut">
               <a:rPr lang="en-US" smtClean="0"/>
-              <a:t>6/9/20</a:t>
+              <a:t>4/29/20</a:t>
             </a:fld>
             <a:endParaRPr lang="en-US"/>
           </a:p>
@@ -2156,7 +2154,7 @@
           <a:p>
             <a:fld id="{23A5DD90-C89A-BB41-88A2-FC1EE1ABBA78}" type="datetimeFigureOut">
               <a:rPr lang="en-US" smtClean="0"/>
-              <a:t>6/9/20</a:t>
+              <a:t>4/29/20</a:t>
             </a:fld>
             <a:endParaRPr lang="en-US"/>
           </a:p>
@@ -2275,7 +2273,7 @@
           <a:p>
             <a:fld id="{23A5DD90-C89A-BB41-88A2-FC1EE1ABBA78}" type="datetimeFigureOut">
               <a:rPr lang="en-US" smtClean="0"/>
-              <a:t>6/9/20</a:t>
+              <a:t>4/29/20</a:t>
             </a:fld>
             <a:endParaRPr lang="en-US"/>
           </a:p>
@@ -2574,7 +2572,7 @@
           <a:p>
             <a:fld id="{23A5DD90-C89A-BB41-88A2-FC1EE1ABBA78}" type="datetimeFigureOut">
               <a:rPr lang="en-US" smtClean="0"/>
-              <a:t>6/9/20</a:t>
+              <a:t>4/29/20</a:t>
             </a:fld>
             <a:endParaRPr lang="en-US"/>
           </a:p>
@@ -2850,7 +2848,7 @@
           <a:p>
             <a:fld id="{23A5DD90-C89A-BB41-88A2-FC1EE1ABBA78}" type="datetimeFigureOut">
               <a:rPr lang="en-US" smtClean="0"/>
-              <a:t>6/9/20</a:t>
+              <a:t>4/29/20</a:t>
             </a:fld>
             <a:endParaRPr lang="en-US"/>
           </a:p>
@@ -3071,6 +3069,35 @@
           <a:xfrm>
             <a:off x="266240" y="5961728"/>
             <a:ext cx="2308459" cy="644060"/>
+          </a:xfrm>
+          <a:prstGeom prst="rect">
+            <a:avLst/>
+          </a:prstGeom>
+        </p:spPr>
+      </p:pic>
+      <p:pic>
+        <p:nvPicPr>
+          <p:cNvPr id="8" name="Picture 7">
+            <a:extLst>
+              <a:ext uri="{FF2B5EF4-FFF2-40B4-BE49-F238E27FC236}">
+                <a16:creationId xmlns="" xmlns:a16="http://schemas.microsoft.com/office/drawing/2014/main" id="{B5D5419E-BC76-244D-BCD4-7C107E7CA66B}"/>
+              </a:ext>
+            </a:extLst>
+          </p:cNvPr>
+          <p:cNvPicPr>
+            <a:picLocks noChangeAspect="1"/>
+          </p:cNvPicPr>
+          <p:nvPr userDrawn="1"/>
+        </p:nvPicPr>
+        <p:blipFill rotWithShape="1">
+          <a:blip r:embed="rId15"/>
+          <a:srcRect l="8187" t="9040" r="14778" b="17170"/>
+          <a:stretch/>
+        </p:blipFill>
+        <p:spPr>
+          <a:xfrm>
+            <a:off x="6824133" y="-2"/>
+            <a:ext cx="5367867" cy="6858002"/>
           </a:xfrm>
           <a:prstGeom prst="rect">
             <a:avLst/>
@@ -3478,129 +3505,6 @@
 </file>
 
 <file path=ppt/slides/slide2.xml><?xml version="1.0" encoding="utf-8"?>
-<p:sld xmlns:a="http://schemas.openxmlformats.org/drawingml/2006/main" xmlns:r="http://schemas.openxmlformats.org/officeDocument/2006/relationships" xmlns:p="http://schemas.openxmlformats.org/presentationml/2006/main">
-  <p:cSld>
-    <p:spTree>
-      <p:nvGrpSpPr>
-        <p:cNvPr id="1" name=""/>
-        <p:cNvGrpSpPr/>
-        <p:nvPr/>
-      </p:nvGrpSpPr>
-      <p:grpSpPr>
-        <a:xfrm>
-          <a:off x="0" y="0"/>
-          <a:ext cx="0" cy="0"/>
-          <a:chOff x="0" y="0"/>
-          <a:chExt cx="0" cy="0"/>
-        </a:xfrm>
-      </p:grpSpPr>
-      <p:sp>
-        <p:nvSpPr>
-          <p:cNvPr id="2" name="Title 1"/>
-          <p:cNvSpPr>
-            <a:spLocks noGrp="1"/>
-          </p:cNvSpPr>
-          <p:nvPr>
-            <p:ph type="title"/>
-          </p:nvPr>
-        </p:nvSpPr>
-        <p:spPr/>
-        <p:txBody>
-          <a:bodyPr/>
-          <a:lstStyle/>
-          <a:p>
-            <a:r>
-              <a:rPr lang="en-US" b="1" dirty="0" smtClean="0">
-                <a:latin typeface="Calibri" panose="020F0502020204030204" pitchFamily="34" charset="0"/>
-                <a:cs typeface="Calibri" panose="020F0502020204030204" pitchFamily="34" charset="0"/>
-              </a:rPr>
-              <a:t>Up FRONT</a:t>
-            </a:r>
-            <a:endParaRPr lang="en-US" b="1" dirty="0">
-              <a:latin typeface="Calibri" panose="020F0502020204030204" pitchFamily="34" charset="0"/>
-              <a:cs typeface="Calibri" panose="020F0502020204030204" pitchFamily="34" charset="0"/>
-            </a:endParaRPr>
-          </a:p>
-        </p:txBody>
-      </p:sp>
-      <p:sp>
-        <p:nvSpPr>
-          <p:cNvPr id="3" name="Content Placeholder 2"/>
-          <p:cNvSpPr>
-            <a:spLocks noGrp="1"/>
-          </p:cNvSpPr>
-          <p:nvPr>
-            <p:ph idx="1"/>
-          </p:nvPr>
-        </p:nvSpPr>
-        <p:spPr/>
-        <p:txBody>
-          <a:bodyPr>
-            <a:normAutofit/>
-          </a:bodyPr>
-          <a:lstStyle/>
-          <a:p>
-            <a:pPr>
-              <a:buClr>
-                <a:srgbClr val="FF0000"/>
-              </a:buClr>
-            </a:pPr>
-            <a:r>
-              <a:rPr lang="en-US" dirty="0" smtClean="0"/>
-              <a:t>I am not a privacy expert</a:t>
-            </a:r>
-            <a:endParaRPr lang="en-US" dirty="0"/>
-          </a:p>
-          <a:p>
-            <a:pPr>
-              <a:buClr>
-                <a:srgbClr val="FF0000"/>
-              </a:buClr>
-            </a:pPr>
-            <a:r>
-              <a:rPr lang="en-US" dirty="0" smtClean="0"/>
-              <a:t>A lot of what I am talking about </a:t>
-            </a:r>
-            <a:br>
-              <a:rPr lang="en-US" dirty="0" smtClean="0"/>
-            </a:br>
-            <a:r>
-              <a:rPr lang="en-US" dirty="0" smtClean="0"/>
-              <a:t>is my own fault</a:t>
-            </a:r>
-            <a:endParaRPr lang="en-US" dirty="0"/>
-          </a:p>
-          <a:p>
-            <a:pPr>
-              <a:buClr>
-                <a:srgbClr val="FF0000"/>
-              </a:buClr>
-            </a:pPr>
-            <a:endParaRPr lang="en-US" dirty="0"/>
-          </a:p>
-        </p:txBody>
-      </p:sp>
-    </p:spTree>
-    <p:extLst>
-      <p:ext uri="{BB962C8B-B14F-4D97-AF65-F5344CB8AC3E}">
-        <p14:creationId xmlns:p14="http://schemas.microsoft.com/office/powerpoint/2010/main" val="1325381325"/>
-      </p:ext>
-    </p:extLst>
-  </p:cSld>
-  <p:clrMapOvr>
-    <a:masterClrMapping/>
-  </p:clrMapOvr>
-  <p:timing>
-    <p:tnLst>
-      <p:par>
-        <p:cTn id="1" dur="indefinite" restart="never" nodeType="tmRoot"/>
-      </p:par>
-    </p:tnLst>
-  </p:timing>
-</p:sld>
-</file>
-
-<file path=ppt/slides/slide3.xml><?xml version="1.0" encoding="utf-8"?>
 <p:sld xmlns:a="http://schemas.openxmlformats.org/drawingml/2006/main" xmlns:r="http://schemas.openxmlformats.org/officeDocument/2006/relationships" xmlns:p="http://schemas.openxmlformats.org/presentationml/2006/main" showMasterSp="0">
   <p:cSld>
     <p:spTree>
@@ -3985,8 +3889,8 @@
         </p:nvSpPr>
         <p:spPr>
           <a:xfrm>
-            <a:off x="7422780" y="3879860"/>
-            <a:ext cx="1479099" cy="1021556"/>
+            <a:off x="7801231" y="3879860"/>
+            <a:ext cx="722184" cy="985838"/>
           </a:xfrm>
           <a:prstGeom prst="roundRect">
             <a:avLst/>
@@ -4033,25 +3937,23 @@
           <a:p>
             <a:pPr algn="ctr"/>
             <a:r>
-              <a:rPr lang="en-US" dirty="0" smtClean="0"/>
+              <a:rPr lang="en-US" dirty="0"/>
               <a:t>2020</a:t>
             </a:r>
           </a:p>
           <a:p>
             <a:pPr algn="ctr"/>
             <a:r>
-              <a:rPr lang="en-US" dirty="0" smtClean="0"/>
-              <a:t>Lock-in LMS</a:t>
-            </a:r>
-            <a:endParaRPr lang="en-US" dirty="0"/>
+              <a:rPr lang="en-US" dirty="0"/>
+              <a:t>SASS</a:t>
+            </a:r>
           </a:p>
           <a:p>
             <a:pPr algn="ctr"/>
             <a:r>
-              <a:rPr lang="en-US" dirty="0" smtClean="0"/>
-              <a:t>Leaking Data</a:t>
-            </a:r>
-            <a:endParaRPr lang="en-US" dirty="0"/>
+              <a:rPr lang="en-US" dirty="0"/>
+              <a:t>LTI</a:t>
+            </a:r>
           </a:p>
         </p:txBody>
       </p:sp>
@@ -4321,8 +4223,8 @@
         </p:nvSpPr>
         <p:spPr>
           <a:xfrm>
-            <a:off x="5847387" y="1902734"/>
-            <a:ext cx="927346" cy="1003697"/>
+            <a:off x="5847564" y="1902734"/>
+            <a:ext cx="926992" cy="1003697"/>
           </a:xfrm>
           <a:prstGeom prst="roundRect">
             <a:avLst/>
@@ -4369,17 +4271,16 @@
           <a:p>
             <a:pPr algn="ctr"/>
             <a:r>
-              <a:rPr lang="en-US" dirty="0" smtClean="0"/>
-              <a:t>2010</a:t>
+              <a:rPr lang="en-US" dirty="0"/>
+              <a:t>2008</a:t>
             </a:r>
           </a:p>
           <a:p>
             <a:pPr algn="ctr"/>
             <a:r>
-              <a:rPr lang="en-US" dirty="0" smtClean="0"/>
+              <a:rPr lang="en-US" dirty="0"/>
               <a:t>Canvas</a:t>
             </a:r>
-            <a:endParaRPr lang="en-US" dirty="0"/>
           </a:p>
           <a:p>
             <a:pPr algn="ctr"/>
@@ -4772,7 +4673,7 @@
         <p:spPr>
           <a:xfrm>
             <a:off x="6774556" y="2906432"/>
-            <a:ext cx="960774" cy="973428"/>
+            <a:ext cx="1026675" cy="1060087"/>
           </a:xfrm>
           <a:prstGeom prst="straightConnector1">
             <a:avLst/>
@@ -5198,6 +5099,188 @@
 </p:sld>
 </file>
 
+<file path=ppt/slides/slide3.xml><?xml version="1.0" encoding="utf-8"?>
+<p:sld xmlns:a="http://schemas.openxmlformats.org/drawingml/2006/main" xmlns:r="http://schemas.openxmlformats.org/officeDocument/2006/relationships" xmlns:p="http://schemas.openxmlformats.org/presentationml/2006/main">
+  <p:cSld>
+    <p:spTree>
+      <p:nvGrpSpPr>
+        <p:cNvPr id="1" name=""/>
+        <p:cNvGrpSpPr/>
+        <p:nvPr/>
+      </p:nvGrpSpPr>
+      <p:grpSpPr>
+        <a:xfrm>
+          <a:off x="0" y="0"/>
+          <a:ext cx="0" cy="0"/>
+          <a:chOff x="0" y="0"/>
+          <a:chExt cx="0" cy="0"/>
+        </a:xfrm>
+      </p:grpSpPr>
+      <p:sp>
+        <p:nvSpPr>
+          <p:cNvPr id="2" name="Title 1"/>
+          <p:cNvSpPr>
+            <a:spLocks noGrp="1"/>
+          </p:cNvSpPr>
+          <p:nvPr>
+            <p:ph type="title"/>
+          </p:nvPr>
+        </p:nvSpPr>
+        <p:spPr/>
+        <p:txBody>
+          <a:bodyPr/>
+          <a:lstStyle/>
+          <a:p>
+            <a:r>
+              <a:rPr lang="en-US" b="1" dirty="0">
+                <a:latin typeface="Calibri" panose="020F0502020204030204" pitchFamily="34" charset="0"/>
+                <a:cs typeface="Calibri" panose="020F0502020204030204" pitchFamily="34" charset="0"/>
+              </a:rPr>
+              <a:t>UPCOMING PODCASTS</a:t>
+            </a:r>
+          </a:p>
+        </p:txBody>
+      </p:sp>
+      <p:sp>
+        <p:nvSpPr>
+          <p:cNvPr id="3" name="Content Placeholder 2"/>
+          <p:cNvSpPr>
+            <a:spLocks noGrp="1"/>
+          </p:cNvSpPr>
+          <p:nvPr>
+            <p:ph idx="1"/>
+          </p:nvPr>
+        </p:nvSpPr>
+        <p:spPr/>
+        <p:txBody>
+          <a:bodyPr>
+            <a:normAutofit/>
+          </a:bodyPr>
+          <a:lstStyle/>
+          <a:p>
+            <a:pPr>
+              <a:buClr>
+                <a:srgbClr val="FF0000"/>
+              </a:buClr>
+            </a:pPr>
+            <a:r>
+              <a:rPr lang="en-US" dirty="0"/>
+              <a:t>A History of </a:t>
+            </a:r>
+            <a:r>
+              <a:rPr lang="en-US" dirty="0" err="1"/>
+              <a:t>EdTech</a:t>
+            </a:r>
+            <a:r>
+              <a:rPr lang="en-US" dirty="0"/>
+              <a:t> Standards</a:t>
+            </a:r>
+          </a:p>
+          <a:p>
+            <a:pPr>
+              <a:buClr>
+                <a:srgbClr val="FF0000"/>
+              </a:buClr>
+            </a:pPr>
+            <a:r>
+              <a:rPr lang="en-US" dirty="0"/>
+              <a:t>The Fallacy of FERPA</a:t>
+            </a:r>
+          </a:p>
+          <a:p>
+            <a:pPr>
+              <a:buClr>
+                <a:srgbClr val="FF0000"/>
+              </a:buClr>
+            </a:pPr>
+            <a:r>
+              <a:rPr lang="en-US" dirty="0"/>
+              <a:t>How </a:t>
+            </a:r>
+            <a:r>
+              <a:rPr lang="en-US" dirty="0" smtClean="0"/>
+              <a:t>Going to </a:t>
+            </a:r>
+            <a:r>
+              <a:rPr lang="en-US" dirty="0"/>
+              <a:t>the Cloud Took a Wrong Turn</a:t>
+            </a:r>
+          </a:p>
+          <a:p>
+            <a:pPr>
+              <a:buClr>
+                <a:srgbClr val="FF0000"/>
+              </a:buClr>
+            </a:pPr>
+            <a:r>
+              <a:rPr lang="en-US" dirty="0"/>
+              <a:t>The Foundations of Privacy in LTI</a:t>
+            </a:r>
+          </a:p>
+          <a:p>
+            <a:pPr>
+              <a:buClr>
+                <a:srgbClr val="FF0000"/>
+              </a:buClr>
+            </a:pPr>
+            <a:r>
+              <a:rPr lang="en-US" dirty="0"/>
+              <a:t>What went wrong with LTI Privacy</a:t>
+            </a:r>
+          </a:p>
+          <a:p>
+            <a:pPr>
+              <a:buClr>
+                <a:srgbClr val="FF0000"/>
+              </a:buClr>
+            </a:pPr>
+            <a:r>
+              <a:rPr lang="en-US" dirty="0"/>
+              <a:t>GDPR Success and Failure</a:t>
+            </a:r>
+          </a:p>
+          <a:p>
+            <a:pPr>
+              <a:buClr>
+                <a:srgbClr val="FF0000"/>
+              </a:buClr>
+            </a:pPr>
+            <a:r>
+              <a:rPr lang="en-US" dirty="0" smtClean="0"/>
+              <a:t>Open Source and Privacy going Forward</a:t>
+            </a:r>
+            <a:endParaRPr lang="en-US" dirty="0"/>
+          </a:p>
+          <a:p>
+            <a:pPr>
+              <a:buClr>
+                <a:srgbClr val="FF0000"/>
+              </a:buClr>
+            </a:pPr>
+            <a:endParaRPr lang="en-US" dirty="0"/>
+          </a:p>
+        </p:txBody>
+      </p:sp>
+    </p:spTree>
+    <p:extLst>
+      <p:ext uri="{BB962C8B-B14F-4D97-AF65-F5344CB8AC3E}">
+        <p14:creationId xmlns:p14="http://schemas.microsoft.com/office/powerpoint/2010/main" val="1808070579"/>
+      </p:ext>
+    </p:extLst>
+  </p:cSld>
+  <p:clrMapOvr>
+    <a:masterClrMapping/>
+  </p:clrMapOvr>
+  <p:timing>
+    <p:tnLst>
+      <p:par>
+        <p:cTn id="1" dur="indefinite" restart="never" nodeType="tmRoot"/>
+      </p:par>
+    </p:tnLst>
+  </p:timing>
+</p:sld>
+</file>
+
 <file path=ppt/slides/slide4.xml><?xml version="1.0" encoding="utf-8"?>
 <p:sld xmlns:a="http://schemas.openxmlformats.org/drawingml/2006/main" xmlns:r="http://schemas.openxmlformats.org/officeDocument/2006/relationships" xmlns:p="http://schemas.openxmlformats.org/presentationml/2006/main">
   <p:cSld>
@@ -5237,6 +5320,7 @@
               </a:rPr>
               <a:t>UPCOMING PODCASTS</a:t>
             </a:r>
+            <a:endParaRPr lang="en-US" dirty="0"/>
           </a:p>
         </p:txBody>
       </p:sp>
@@ -5264,15 +5348,7 @@
             </a:pPr>
             <a:r>
               <a:rPr lang="en-US" dirty="0"/>
-              <a:t>A History of </a:t>
-            </a:r>
-            <a:r>
-              <a:rPr lang="en-US" dirty="0" err="1"/>
-              <a:t>EdTech</a:t>
-            </a:r>
-            <a:r>
-              <a:rPr lang="en-US" dirty="0"/>
-              <a:t> Standards</a:t>
+              <a:t>What you Should do Right Now!</a:t>
             </a:r>
           </a:p>
           <a:p>
@@ -5283,15 +5359,15 @@
             </a:pPr>
             <a:r>
               <a:rPr lang="en-US" dirty="0"/>
-              <a:t>The </a:t>
-            </a:r>
-            <a:r>
-              <a:rPr lang="en-US" dirty="0" smtClean="0"/>
-              <a:t>Fallacy </a:t>
+              <a:t>The Financial Circle of </a:t>
+            </a:r>
+            <a:r>
+              <a:rPr lang="en-US" dirty="0" err="1"/>
+              <a:t>EdTech</a:t>
             </a:r>
             <a:r>
               <a:rPr lang="en-US" dirty="0"/>
-              <a:t>of FERPA</a:t>
+              <a:t> Life</a:t>
             </a:r>
           </a:p>
           <a:p>
@@ -5302,15 +5378,7 @@
             </a:pPr>
             <a:r>
               <a:rPr lang="en-US" dirty="0"/>
-              <a:t>How </a:t>
-            </a:r>
-            <a:r>
-              <a:rPr lang="en-US" dirty="0" smtClean="0"/>
-              <a:t>Going to </a:t>
-            </a:r>
-            <a:r>
-              <a:rPr lang="en-US" dirty="0"/>
-              <a:t>the Cloud Took a Wrong Turn</a:t>
+              <a:t>Preparing your Faculty and Students for Privacy</a:t>
             </a:r>
           </a:p>
           <a:p>
@@ -5321,11 +5389,7 @@
             </a:pPr>
             <a:r>
               <a:rPr lang="en-US" dirty="0"/>
-              <a:t>The Foundations of Privacy in </a:t>
-            </a:r>
-            <a:r>
-              <a:rPr lang="en-US" dirty="0" smtClean="0"/>
-              <a:t>LTI</a:t>
+              <a:t>You can protect Learner Privacy</a:t>
             </a:r>
           </a:p>
           <a:p>
@@ -5336,11 +5400,33 @@
             </a:pPr>
             <a:r>
               <a:rPr lang="en-US" dirty="0"/>
-              <a:t>GDPR Success and </a:t>
+              <a:t>Companies you can (or might as well) trust</a:t>
+            </a:r>
+          </a:p>
+          <a:p>
+            <a:pPr>
+              <a:buClr>
+                <a:srgbClr val="FF0000"/>
+              </a:buClr>
+            </a:pPr>
+            <a:r>
+              <a:rPr lang="en-US" dirty="0"/>
+              <a:t>Planning your Escape from your SASS Vendor</a:t>
+            </a:r>
+          </a:p>
+          <a:p>
+            <a:pPr>
+              <a:buClr>
+                <a:srgbClr val="FF0000"/>
+              </a:buClr>
+            </a:pPr>
+            <a:r>
+              <a:rPr lang="en-US" dirty="0"/>
+              <a:t>Fixing or Leaving Your LTI </a:t>
             </a:r>
             <a:r>
               <a:rPr lang="en-US" dirty="0" smtClean="0"/>
-              <a:t>Failure</a:t>
+              <a:t>Vendor(s)</a:t>
             </a:r>
             <a:endParaRPr lang="en-US" dirty="0"/>
           </a:p>
@@ -5349,7 +5435,7 @@
     </p:spTree>
     <p:extLst>
       <p:ext uri="{BB962C8B-B14F-4D97-AF65-F5344CB8AC3E}">
-        <p14:creationId xmlns:p14="http://schemas.microsoft.com/office/powerpoint/2010/main" val="1808070579"/>
+        <p14:creationId xmlns:p14="http://schemas.microsoft.com/office/powerpoint/2010/main" val="782331038"/>
       </p:ext>
     </p:extLst>
   </p:cSld>
@@ -5432,16 +5518,8 @@
               </a:buClr>
             </a:pPr>
             <a:r>
-              <a:rPr lang="en-US" dirty="0" smtClean="0"/>
-              <a:t>How Open </a:t>
-            </a:r>
-            <a:r>
               <a:rPr lang="en-US" dirty="0"/>
-              <a:t>Source </a:t>
-            </a:r>
-            <a:r>
-              <a:rPr lang="en-US" dirty="0" smtClean="0"/>
-              <a:t>Can Lead the Way</a:t>
+              <a:t>Reclaiming your Learner Data</a:t>
             </a:r>
           </a:p>
           <a:p>
@@ -5451,10 +5529,18 @@
               </a:buClr>
             </a:pPr>
             <a:r>
-              <a:rPr lang="en-US" dirty="0" smtClean="0"/>
-              <a:t>Your First Privacy Steps</a:t>
-            </a:r>
-            <a:endParaRPr lang="en-US" dirty="0"/>
+              <a:rPr lang="en-US" dirty="0" err="1"/>
+              <a:t>EdTech's</a:t>
+            </a:r>
+            <a:r>
+              <a:rPr lang="en-US" dirty="0"/>
+              <a:t> Cambridge </a:t>
+            </a:r>
+            <a:r>
+              <a:rPr lang="en-US" dirty="0" err="1" smtClean="0"/>
+              <a:t>Analytica</a:t>
+            </a:r>
+            <a:endParaRPr lang="en-US" dirty="0" smtClean="0"/>
           </a:p>
           <a:p>
             <a:pPr>
@@ -5463,38 +5549,8 @@
               </a:buClr>
             </a:pPr>
             <a:r>
-              <a:rPr lang="en-US" dirty="0"/>
-              <a:t>The Financial Circle of </a:t>
-            </a:r>
-            <a:r>
-              <a:rPr lang="en-US" dirty="0" err="1"/>
-              <a:t>EdTech</a:t>
-            </a:r>
-            <a:r>
-              <a:rPr lang="en-US" dirty="0"/>
-              <a:t> Life</a:t>
-            </a:r>
-          </a:p>
-          <a:p>
-            <a:pPr>
-              <a:buClr>
-                <a:srgbClr val="FF0000"/>
-              </a:buClr>
-            </a:pPr>
-            <a:r>
-              <a:rPr lang="en-US" dirty="0"/>
-              <a:t>Preparing your Faculty and Students for Privacy</a:t>
-            </a:r>
-          </a:p>
-          <a:p>
-            <a:pPr>
-              <a:buClr>
-                <a:srgbClr val="FF0000"/>
-              </a:buClr>
-            </a:pPr>
-            <a:r>
               <a:rPr lang="en-US" dirty="0" smtClean="0"/>
-              <a:t>Learner Privacy is achievable</a:t>
+              <a:t>Topics arising...</a:t>
             </a:r>
             <a:endParaRPr lang="en-US" dirty="0"/>
           </a:p>
@@ -5503,7 +5559,7 @@
     </p:spTree>
     <p:extLst>
       <p:ext uri="{BB962C8B-B14F-4D97-AF65-F5344CB8AC3E}">
-        <p14:creationId xmlns:p14="http://schemas.microsoft.com/office/powerpoint/2010/main" val="782331038"/>
+        <p14:creationId xmlns:p14="http://schemas.microsoft.com/office/powerpoint/2010/main" val="193315059"/>
       </p:ext>
     </p:extLst>
   </p:cSld>
@@ -5553,148 +5609,6 @@
           <a:lstStyle/>
           <a:p>
             <a:r>
-              <a:rPr lang="en-US" b="1" dirty="0">
-                <a:latin typeface="Calibri" panose="020F0502020204030204" pitchFamily="34" charset="0"/>
-                <a:cs typeface="Calibri" panose="020F0502020204030204" pitchFamily="34" charset="0"/>
-              </a:rPr>
-              <a:t>UPCOMING PODCASTS</a:t>
-            </a:r>
-            <a:endParaRPr lang="en-US" dirty="0"/>
-          </a:p>
-        </p:txBody>
-      </p:sp>
-      <p:sp>
-        <p:nvSpPr>
-          <p:cNvPr id="3" name="Content Placeholder 2"/>
-          <p:cNvSpPr>
-            <a:spLocks noGrp="1"/>
-          </p:cNvSpPr>
-          <p:nvPr>
-            <p:ph idx="1"/>
-          </p:nvPr>
-        </p:nvSpPr>
-        <p:spPr/>
-        <p:txBody>
-          <a:bodyPr>
-            <a:normAutofit/>
-          </a:bodyPr>
-          <a:lstStyle/>
-          <a:p>
-            <a:pPr>
-              <a:buClr>
-                <a:srgbClr val="FF0000"/>
-              </a:buClr>
-            </a:pPr>
-            <a:r>
-              <a:rPr lang="en-US" dirty="0"/>
-              <a:t>Planning your Escape from your SASS Vendor</a:t>
-            </a:r>
-          </a:p>
-          <a:p>
-            <a:pPr>
-              <a:buClr>
-                <a:srgbClr val="FF0000"/>
-              </a:buClr>
-            </a:pPr>
-            <a:r>
-              <a:rPr lang="en-US" dirty="0" smtClean="0"/>
-              <a:t>Pressuring your </a:t>
-            </a:r>
-            <a:r>
-              <a:rPr lang="en-US" dirty="0"/>
-              <a:t>LTI Vendor(s)</a:t>
-            </a:r>
-          </a:p>
-          <a:p>
-            <a:pPr>
-              <a:buClr>
-                <a:srgbClr val="FF0000"/>
-              </a:buClr>
-            </a:pPr>
-            <a:r>
-              <a:rPr lang="en-US" dirty="0" smtClean="0"/>
-              <a:t>Reclaiming </a:t>
-            </a:r>
-            <a:r>
-              <a:rPr lang="en-US" dirty="0"/>
-              <a:t>your Learner Data</a:t>
-            </a:r>
-          </a:p>
-          <a:p>
-            <a:pPr>
-              <a:buClr>
-                <a:srgbClr val="FF0000"/>
-              </a:buClr>
-            </a:pPr>
-            <a:r>
-              <a:rPr lang="en-US" dirty="0" err="1"/>
-              <a:t>EdTech's</a:t>
-            </a:r>
-            <a:r>
-              <a:rPr lang="en-US" dirty="0"/>
-              <a:t> Cambridge </a:t>
-            </a:r>
-            <a:r>
-              <a:rPr lang="en-US" dirty="0" err="1" smtClean="0"/>
-              <a:t>Analytica</a:t>
-            </a:r>
-            <a:endParaRPr lang="en-US" dirty="0" smtClean="0"/>
-          </a:p>
-        </p:txBody>
-      </p:sp>
-    </p:spTree>
-    <p:extLst>
-      <p:ext uri="{BB962C8B-B14F-4D97-AF65-F5344CB8AC3E}">
-        <p14:creationId xmlns:p14="http://schemas.microsoft.com/office/powerpoint/2010/main" val="193315059"/>
-      </p:ext>
-    </p:extLst>
-  </p:cSld>
-  <p:clrMapOvr>
-    <a:masterClrMapping/>
-  </p:clrMapOvr>
-  <p:timing>
-    <p:tnLst>
-      <p:par>
-        <p:cTn id="1" dur="indefinite" restart="never" nodeType="tmRoot"/>
-      </p:par>
-    </p:tnLst>
-  </p:timing>
-</p:sld>
-</file>
-
-<file path=ppt/slides/slide7.xml><?xml version="1.0" encoding="utf-8"?>
-<p:sld xmlns:a="http://schemas.openxmlformats.org/drawingml/2006/main" xmlns:r="http://schemas.openxmlformats.org/officeDocument/2006/relationships" xmlns:p="http://schemas.openxmlformats.org/presentationml/2006/main">
-  <p:cSld>
-    <p:spTree>
-      <p:nvGrpSpPr>
-        <p:cNvPr id="1" name=""/>
-        <p:cNvGrpSpPr/>
-        <p:nvPr/>
-      </p:nvGrpSpPr>
-      <p:grpSpPr>
-        <a:xfrm>
-          <a:off x="0" y="0"/>
-          <a:ext cx="0" cy="0"/>
-          <a:chOff x="0" y="0"/>
-          <a:chExt cx="0" cy="0"/>
-        </a:xfrm>
-      </p:grpSpPr>
-      <p:sp>
-        <p:nvSpPr>
-          <p:cNvPr id="2" name="Title 1"/>
-          <p:cNvSpPr>
-            <a:spLocks noGrp="1"/>
-          </p:cNvSpPr>
-          <p:nvPr>
-            <p:ph type="title"/>
-          </p:nvPr>
-        </p:nvSpPr>
-        <p:spPr/>
-        <p:txBody>
-          <a:bodyPr/>
-          <a:lstStyle/>
-          <a:p>
-            <a:r>
               <a:rPr lang="en-US" b="1" dirty="0" smtClean="0">
                 <a:latin typeface="+mn-lt"/>
               </a:rPr>
@@ -5739,7 +5653,7 @@
             </a:pPr>
             <a:r>
               <a:rPr lang="en-US" dirty="0" smtClean="0"/>
-              <a:t>Guests</a:t>
+              <a:t>Guest podcasts</a:t>
             </a:r>
           </a:p>
           <a:p>
@@ -5761,15 +5675,7 @@
             </a:pPr>
             <a:r>
               <a:rPr lang="en-US" dirty="0" smtClean="0"/>
-              <a:t>Consulting </a:t>
-            </a:r>
-            <a:r>
-              <a:rPr lang="mr-IN" dirty="0" smtClean="0"/>
-              <a:t>–</a:t>
-            </a:r>
-            <a:r>
-              <a:rPr lang="en-US" dirty="0" smtClean="0"/>
-              <a:t> companies / universities</a:t>
+              <a:t>Advisory / review group contact me</a:t>
             </a:r>
           </a:p>
           <a:p>
@@ -5780,15 +5686,15 @@
             </a:pPr>
             <a:r>
               <a:rPr lang="en-US" dirty="0" smtClean="0"/>
-              <a:t>Apologize</a:t>
-            </a:r>
-            <a:r>
-              <a:rPr lang="en-US" dirty="0"/>
-              <a:t> </a:t>
+              <a:t>Consulting </a:t>
+            </a:r>
+            <a:r>
+              <a:rPr lang="mr-IN" dirty="0" smtClean="0"/>
+              <a:t>–</a:t>
             </a:r>
             <a:r>
               <a:rPr lang="en-US" dirty="0" smtClean="0"/>
-              <a:t>(again)...</a:t>
+              <a:t> companies / universities</a:t>
             </a:r>
             <a:endParaRPr lang="en-US" dirty="0"/>
           </a:p>
@@ -5798,102 +5704,6 @@
     <p:extLst>
       <p:ext uri="{BB962C8B-B14F-4D97-AF65-F5344CB8AC3E}">
         <p14:creationId xmlns:p14="http://schemas.microsoft.com/office/powerpoint/2010/main" val="240360490"/>
-      </p:ext>
-    </p:extLst>
-  </p:cSld>
-  <p:clrMapOvr>
-    <a:masterClrMapping/>
-  </p:clrMapOvr>
-  <p:timing>
-    <p:tnLst>
-      <p:par>
-        <p:cTn id="1" dur="indefinite" restart="never" nodeType="tmRoot"/>
-      </p:par>
-    </p:tnLst>
-  </p:timing>
-</p:sld>
-</file>
-
-<file path=ppt/slides/slide8.xml><?xml version="1.0" encoding="utf-8"?>
-<p:sld xmlns:a="http://schemas.openxmlformats.org/drawingml/2006/main" xmlns:r="http://schemas.openxmlformats.org/officeDocument/2006/relationships" xmlns:p="http://schemas.openxmlformats.org/presentationml/2006/main" showMasterSp="0">
-  <p:cSld>
-    <p:spTree>
-      <p:nvGrpSpPr>
-        <p:cNvPr id="1" name=""/>
-        <p:cNvGrpSpPr/>
-        <p:nvPr/>
-      </p:nvGrpSpPr>
-      <p:grpSpPr>
-        <a:xfrm>
-          <a:off x="0" y="0"/>
-          <a:ext cx="0" cy="0"/>
-          <a:chOff x="0" y="0"/>
-          <a:chExt cx="0" cy="0"/>
-        </a:xfrm>
-      </p:grpSpPr>
-      <p:pic>
-        <p:nvPicPr>
-          <p:cNvPr id="6" name="Picture 5"/>
-          <p:cNvPicPr>
-            <a:picLocks noChangeAspect="1"/>
-          </p:cNvPicPr>
-          <p:nvPr/>
-        </p:nvPicPr>
-        <p:blipFill>
-          <a:blip r:embed="rId2">
-            <a:extLst>
-              <a:ext uri="{28A0092B-C50C-407E-A947-70E740481C1C}">
-                <a14:useLocalDpi xmlns:a14="http://schemas.microsoft.com/office/drawing/2010/main" val="0"/>
-              </a:ext>
-            </a:extLst>
-          </a:blip>
-          <a:stretch>
-            <a:fillRect/>
-          </a:stretch>
-        </p:blipFill>
-        <p:spPr>
-          <a:xfrm>
-            <a:off x="769808" y="1208768"/>
-            <a:ext cx="5304069" cy="4243255"/>
-          </a:xfrm>
-          <a:prstGeom prst="rect">
-            <a:avLst/>
-          </a:prstGeom>
-        </p:spPr>
-      </p:pic>
-      <p:pic>
-        <p:nvPicPr>
-          <p:cNvPr id="3" name="Picture 2">
-            <a:extLst>
-              <a:ext uri="{FF2B5EF4-FFF2-40B4-BE49-F238E27FC236}">
-                <a16:creationId xmlns="" xmlns:a16="http://schemas.microsoft.com/office/drawing/2014/main" id="{EDD31862-E10B-274C-9571-3BE694A2173A}"/>
-              </a:ext>
-            </a:extLst>
-          </p:cNvPr>
-          <p:cNvPicPr>
-            <a:picLocks noChangeAspect="1"/>
-          </p:cNvPicPr>
-          <p:nvPr/>
-        </p:nvPicPr>
-        <p:blipFill rotWithShape="1">
-          <a:blip r:embed="rId3"/>
-          <a:srcRect l="8187" t="9040" r="14778" b="17170"/>
-          <a:stretch/>
-        </p:blipFill>
-        <p:spPr>
-          <a:xfrm>
-            <a:off x="6824133" y="-1"/>
-            <a:ext cx="5367867" cy="6858002"/>
-          </a:xfrm>
-          <a:prstGeom prst="rect">
-            <a:avLst/>
-          </a:prstGeom>
-        </p:spPr>
-      </p:pic>
-    </p:spTree>
-    <p:extLst>
-      <p:ext uri="{BB962C8B-B14F-4D97-AF65-F5344CB8AC3E}">
-        <p14:creationId xmlns:p14="http://schemas.microsoft.com/office/powerpoint/2010/main" val="1194588958"/>
       </p:ext>
     </p:extLst>
   </p:cSld>

</xml_diff>